<commit_message>
Slide updates post Sage review
</commit_message>
<xml_diff>
--- a/Slides/02_Lecture.pptx
+++ b/Slides/02_Lecture.pptx
@@ -210,7 +210,7 @@
           <a:p>
             <a:fld id="{16136E8F-1965-6C44-A7B5-03BB9B497561}" type="datetimeFigureOut">
               <a:rPr lang="en-GB" smtClean="0"/>
-              <a:t>21/09/2017</a:t>
+              <a:t>07/11/2017</a:t>
             </a:fld>
             <a:endParaRPr lang="en-GB"/>
           </a:p>
@@ -609,7 +609,7 @@
           <a:p>
             <a:fld id="{C380D008-60B2-0246-B113-8E855462598C}" type="datetimeFigureOut">
               <a:rPr lang="en-GB" smtClean="0"/>
-              <a:t>21/09/2017</a:t>
+              <a:t>07/11/2017</a:t>
             </a:fld>
             <a:endParaRPr lang="en-GB"/>
           </a:p>
@@ -774,7 +774,7 @@
           <a:p>
             <a:fld id="{C380D008-60B2-0246-B113-8E855462598C}" type="datetimeFigureOut">
               <a:rPr lang="en-GB" smtClean="0"/>
-              <a:t>21/09/2017</a:t>
+              <a:t>07/11/2017</a:t>
             </a:fld>
             <a:endParaRPr lang="en-GB"/>
           </a:p>
@@ -949,7 +949,7 @@
           <a:p>
             <a:fld id="{C380D008-60B2-0246-B113-8E855462598C}" type="datetimeFigureOut">
               <a:rPr lang="en-GB" smtClean="0"/>
-              <a:t>21/09/2017</a:t>
+              <a:t>07/11/2017</a:t>
             </a:fld>
             <a:endParaRPr lang="en-GB"/>
           </a:p>
@@ -1114,7 +1114,7 @@
           <a:p>
             <a:fld id="{C380D008-60B2-0246-B113-8E855462598C}" type="datetimeFigureOut">
               <a:rPr lang="en-GB" smtClean="0"/>
-              <a:t>21/09/2017</a:t>
+              <a:t>07/11/2017</a:t>
             </a:fld>
             <a:endParaRPr lang="en-GB"/>
           </a:p>
@@ -1353,7 +1353,7 @@
           <a:p>
             <a:fld id="{C380D008-60B2-0246-B113-8E855462598C}" type="datetimeFigureOut">
               <a:rPr lang="en-GB" smtClean="0"/>
-              <a:t>21/09/2017</a:t>
+              <a:t>07/11/2017</a:t>
             </a:fld>
             <a:endParaRPr lang="en-GB"/>
           </a:p>
@@ -1580,7 +1580,7 @@
           <a:p>
             <a:fld id="{C380D008-60B2-0246-B113-8E855462598C}" type="datetimeFigureOut">
               <a:rPr lang="en-GB" smtClean="0"/>
-              <a:t>21/09/2017</a:t>
+              <a:t>07/11/2017</a:t>
             </a:fld>
             <a:endParaRPr lang="en-GB"/>
           </a:p>
@@ -1942,7 +1942,7 @@
           <a:p>
             <a:fld id="{C380D008-60B2-0246-B113-8E855462598C}" type="datetimeFigureOut">
               <a:rPr lang="en-GB" smtClean="0"/>
-              <a:t>21/09/2017</a:t>
+              <a:t>07/11/2017</a:t>
             </a:fld>
             <a:endParaRPr lang="en-GB"/>
           </a:p>
@@ -2055,7 +2055,7 @@
           <a:p>
             <a:fld id="{C380D008-60B2-0246-B113-8E855462598C}" type="datetimeFigureOut">
               <a:rPr lang="en-GB" smtClean="0"/>
-              <a:t>21/09/2017</a:t>
+              <a:t>07/11/2017</a:t>
             </a:fld>
             <a:endParaRPr lang="en-GB"/>
           </a:p>
@@ -2145,7 +2145,7 @@
           <a:p>
             <a:fld id="{C380D008-60B2-0246-B113-8E855462598C}" type="datetimeFigureOut">
               <a:rPr lang="en-GB" smtClean="0"/>
-              <a:t>21/09/2017</a:t>
+              <a:t>07/11/2017</a:t>
             </a:fld>
             <a:endParaRPr lang="en-GB"/>
           </a:p>
@@ -2417,7 +2417,7 @@
           <a:p>
             <a:fld id="{C380D008-60B2-0246-B113-8E855462598C}" type="datetimeFigureOut">
               <a:rPr lang="en-GB" smtClean="0"/>
-              <a:t>21/09/2017</a:t>
+              <a:t>07/11/2017</a:t>
             </a:fld>
             <a:endParaRPr lang="en-GB"/>
           </a:p>
@@ -2669,7 +2669,7 @@
           <a:p>
             <a:fld id="{C380D008-60B2-0246-B113-8E855462598C}" type="datetimeFigureOut">
               <a:rPr lang="en-GB" smtClean="0"/>
-              <a:t>21/09/2017</a:t>
+              <a:t>07/11/2017</a:t>
             </a:fld>
             <a:endParaRPr lang="en-GB"/>
           </a:p>
@@ -2877,7 +2877,7 @@
           <a:p>
             <a:fld id="{C380D008-60B2-0246-B113-8E855462598C}" type="datetimeFigureOut">
               <a:rPr lang="en-GB" smtClean="0"/>
-              <a:t>21/09/2017</a:t>
+              <a:t>07/11/2017</a:t>
             </a:fld>
             <a:endParaRPr lang="en-GB"/>
           </a:p>
@@ -3320,7 +3320,7 @@
           <a:bodyPr/>
           <a:lstStyle/>
           <a:p>
-            <a:endParaRPr lang="en-GB"/>
+            <a:endParaRPr lang="en-GB" dirty="0"/>
           </a:p>
         </p:txBody>
       </p:sp>
@@ -3543,8 +3543,32 @@
               <a:buNone/>
             </a:pPr>
             <a:r>
-              <a:rPr lang="en-GB" smtClean="0"/>
-              <a:t>Alex D Singleton, Seth E Spielman, David C Folch (2017) Urban Analytics. London: Sage.</a:t>
+              <a:rPr lang="en-GB" dirty="0" smtClean="0"/>
+              <a:t>Alex D. Singleton, Seth E. </a:t>
+            </a:r>
+            <a:r>
+              <a:rPr lang="en-GB" dirty="0" err="1" smtClean="0"/>
+              <a:t>Spielman</a:t>
+            </a:r>
+            <a:r>
+              <a:rPr lang="en-GB" dirty="0" smtClean="0"/>
+              <a:t>, David C. </a:t>
+            </a:r>
+            <a:r>
+              <a:rPr lang="en-GB" dirty="0" err="1" smtClean="0"/>
+              <a:t>Folch</a:t>
+            </a:r>
+            <a:r>
+              <a:rPr lang="en-GB" dirty="0" smtClean="0"/>
+              <a:t> (2017) </a:t>
+            </a:r>
+            <a:r>
+              <a:rPr lang="en-GB" i="1" dirty="0" smtClean="0"/>
+              <a:t>Urban Analytics</a:t>
+            </a:r>
+            <a:r>
+              <a:rPr lang="en-GB" dirty="0" smtClean="0"/>
+              <a:t>. London: Sage.</a:t>
             </a:r>
             <a:endParaRPr lang="en-GB" dirty="0"/>
           </a:p>
@@ -3617,8 +3641,8 @@
         </p:nvSpPr>
         <p:spPr>
           <a:xfrm>
-            <a:off x="3604591" y="5464722"/>
-            <a:ext cx="5360504" cy="738664"/>
+            <a:off x="1216325" y="5464722"/>
+            <a:ext cx="7748770" cy="523220"/>
           </a:xfrm>
           <a:prstGeom prst="rect">
             <a:avLst/>
@@ -3651,33 +3675,57 @@
           </a:p>
           <a:p>
             <a:r>
+              <a:rPr lang="en-US" sz="1400" i="1" dirty="0">
+                <a:solidFill>
+                  <a:srgbClr val="222222"/>
+                </a:solidFill>
+                <a:latin typeface="Arial" charset="0"/>
+              </a:rPr>
+              <a:t>Source</a:t>
+            </a:r>
+            <a:r>
               <a:rPr lang="en-US" sz="1400" dirty="0">
                 <a:solidFill>
                   <a:srgbClr val="222222"/>
                 </a:solidFill>
                 <a:latin typeface="Arial" charset="0"/>
               </a:rPr>
-              <a:t>Source: https://</a:t>
-            </a:r>
-            <a:r>
-              <a:rPr lang="en-US" sz="1400" dirty="0" err="1">
+              <a:t>: </a:t>
+            </a:r>
+            <a:r>
+              <a:rPr lang="en-US" sz="1400" dirty="0">
+                <a:solidFill>
+                  <a:srgbClr val="222222"/>
+                </a:solidFill>
+                <a:latin typeface="Arial" charset="0"/>
+                <a:hlinkClick r:id="rId3"/>
+              </a:rPr>
+              <a:t>https://en.wikipedia.org/wiki/Tianhe-2#/</a:t>
+            </a:r>
+            <a:r>
+              <a:rPr lang="en-US" sz="1400" dirty="0" smtClean="0">
+                <a:solidFill>
+                  <a:srgbClr val="222222"/>
+                </a:solidFill>
+                <a:latin typeface="Arial" charset="0"/>
+                <a:hlinkClick r:id="rId3"/>
+              </a:rPr>
+              <a:t>media/File:Tianhe-2.jpg</a:t>
+            </a:r>
+            <a:r>
+              <a:rPr lang="en-US" sz="1400" dirty="0" smtClean="0">
                 <a:solidFill>
                   <a:srgbClr val="222222"/>
                 </a:solidFill>
                 <a:latin typeface="Arial" charset="0"/>
               </a:rPr>
-              <a:t>en.wikipedia.org</a:t>
-            </a:r>
-            <a:r>
-              <a:rPr lang="en-US" sz="1400" dirty="0">
-                <a:solidFill>
-                  <a:srgbClr val="222222"/>
-                </a:solidFill>
-                <a:latin typeface="Arial" charset="0"/>
-              </a:rPr>
-              <a:t>/wiki/Tianhe-2#/media/File:Tianhe-2.jpg</a:t>
-            </a:r>
-            <a:endParaRPr lang="en-GB" sz="1400" dirty="0"/>
+              <a:t>. </a:t>
+            </a:r>
+            <a:r>
+              <a:rPr lang="en-GB" sz="1400" dirty="0"/>
+              <a:t>CC BY-SA 4.0</a:t>
+            </a:r>
+            <a:endParaRPr lang="en-GB" sz="1100" dirty="0"/>
           </a:p>
         </p:txBody>
       </p:sp>
@@ -3810,8 +3858,16 @@
           <a:p>
             <a:pPr lvl="2"/>
             <a:r>
+              <a:rPr lang="en-GB" dirty="0"/>
+              <a:t>e</a:t>
+            </a:r>
+            <a:r>
               <a:rPr lang="en-GB" dirty="0" smtClean="0"/>
-              <a:t>E.g. agent based modelling</a:t>
+              <a:t>.g. agent-based </a:t>
+            </a:r>
+            <a:r>
+              <a:rPr lang="en-GB" dirty="0" err="1" smtClean="0"/>
+              <a:t>modeling</a:t>
             </a:r>
             <a:endParaRPr lang="en-GB" dirty="0"/>
           </a:p>
@@ -3917,7 +3973,7 @@
         <p:spPr/>
         <p:txBody>
           <a:bodyPr>
-            <a:normAutofit fontScale="85000" lnSpcReduction="10000"/>
+            <a:normAutofit fontScale="85000" lnSpcReduction="20000"/>
           </a:bodyPr>
           <a:lstStyle/>
           <a:p>
@@ -4026,23 +4082,29 @@
             <a:pPr lvl="2"/>
             <a:r>
               <a:rPr lang="en-US" dirty="0"/>
-              <a:t>Responsible Recycling (R2) (sustain- </a:t>
-            </a:r>
-            <a:r>
-              <a:rPr lang="en-US" dirty="0" err="1"/>
-              <a:t>ableelectronics.org</a:t>
+              <a:t>Responsible Recycling (R2) (</a:t>
+            </a:r>
+            <a:r>
+              <a:rPr lang="en-US" dirty="0" smtClean="0"/>
+              <a:t>sustainableelectronics.org</a:t>
             </a:r>
             <a:r>
               <a:rPr lang="en-US" dirty="0"/>
-              <a:t>) or e-Stewards (e-</a:t>
-            </a:r>
-            <a:r>
-              <a:rPr lang="en-US" dirty="0" err="1"/>
-              <a:t>stewards.org</a:t>
+              <a:t>) or e-Stewards </a:t>
+            </a:r>
+            <a:endParaRPr lang="en-US" dirty="0" smtClean="0"/>
+          </a:p>
+          <a:p>
+            <a:pPr marL="914400" lvl="2" indent="0">
+              <a:buNone/>
+            </a:pPr>
+            <a:r>
+              <a:rPr lang="en-US" dirty="0" smtClean="0"/>
+              <a:t>    (</a:t>
             </a:r>
             <a:r>
               <a:rPr lang="en-US" dirty="0"/>
-              <a:t>) standards </a:t>
+              <a:t>e-stewards.org) standards </a:t>
             </a:r>
           </a:p>
           <a:p>
@@ -4535,11 +4597,7 @@
             <a:pPr lvl="1"/>
             <a:r>
               <a:rPr lang="en-US" dirty="0" smtClean="0"/>
-              <a:t>A </a:t>
-            </a:r>
-            <a:r>
-              <a:rPr lang="en-US" u="sng" dirty="0" smtClean="0"/>
-              <a:t>system unit</a:t>
+              <a:t>A system unit</a:t>
             </a:r>
           </a:p>
           <a:p>
@@ -4557,8 +4615,8 @@
         </p:nvSpPr>
         <p:spPr>
           <a:xfrm>
-            <a:off x="628650" y="3786118"/>
-            <a:ext cx="4871002" cy="1802227"/>
+            <a:off x="628649" y="3786118"/>
+            <a:ext cx="5668633" cy="1802227"/>
           </a:xfrm>
           <a:prstGeom prst="rect">
             <a:avLst/>
@@ -4566,7 +4624,7 @@
         </p:spPr>
         <p:txBody>
           <a:bodyPr vert="horz" lIns="91440" tIns="45720" rIns="91440" bIns="45720" rtlCol="0">
-            <a:normAutofit lnSpcReduction="10000"/>
+            <a:normAutofit/>
           </a:bodyPr>
           <a:lstStyle>
             <a:lvl1pPr marL="228600" indent="-228600" algn="l" defTabSz="914400" rtl="0" eaLnBrk="1" latinLnBrk="0" hangingPunct="1">
@@ -4735,15 +4793,7 @@
           <a:p>
             <a:r>
               <a:rPr lang="en-US" dirty="0"/>
-              <a:t>A </a:t>
-            </a:r>
-            <a:r>
-              <a:rPr lang="en-US" u="sng" dirty="0"/>
-              <a:t>system unit </a:t>
-            </a:r>
-            <a:r>
-              <a:rPr lang="en-US" dirty="0"/>
-              <a:t>is composed of</a:t>
+              <a:t>A system unit is composed of</a:t>
             </a:r>
           </a:p>
           <a:p>
@@ -5032,8 +5082,8 @@
         </p:nvSpPr>
         <p:spPr>
           <a:xfrm>
-            <a:off x="4629150" y="5788678"/>
-            <a:ext cx="4457700" cy="954107"/>
+            <a:off x="4572000" y="5788678"/>
+            <a:ext cx="4457700" cy="815608"/>
           </a:xfrm>
           <a:prstGeom prst="rect">
             <a:avLst/>
@@ -5052,29 +5102,40 @@
           </a:p>
           <a:p>
             <a:r>
-              <a:rPr lang="en-GB" sz="1400" dirty="0" smtClean="0"/>
-              <a:t>Source: https</a:t>
-            </a:r>
-            <a:r>
-              <a:rPr lang="en-GB" sz="1400" dirty="0"/>
-              <a:t>://</a:t>
-            </a:r>
-            <a:r>
-              <a:rPr lang="en-GB" sz="1400" dirty="0" err="1"/>
-              <a:t>en.wikipedia.org</a:t>
-            </a:r>
-            <a:r>
-              <a:rPr lang="en-GB" sz="1400" dirty="0"/>
-              <a:t>/wiki/</a:t>
-            </a:r>
-            <a:r>
-              <a:rPr lang="en-GB" sz="1400" dirty="0" err="1"/>
-              <a:t>Central_processing_unit</a:t>
-            </a:r>
-            <a:r>
-              <a:rPr lang="en-GB" sz="1400" dirty="0"/>
-              <a:t>#/media/File:Intel_80486DX2_bottom.jpg</a:t>
-            </a:r>
+              <a:rPr lang="en-GB" sz="1100" i="1" dirty="0" smtClean="0"/>
+              <a:t>Source</a:t>
+            </a:r>
+            <a:r>
+              <a:rPr lang="en-GB" sz="1100" dirty="0" smtClean="0"/>
+              <a:t>: </a:t>
+            </a:r>
+            <a:r>
+              <a:rPr lang="en-GB" sz="1100" dirty="0" smtClean="0">
+                <a:hlinkClick r:id="rId3"/>
+              </a:rPr>
+              <a:t>https</a:t>
+            </a:r>
+            <a:r>
+              <a:rPr lang="en-GB" sz="1100" dirty="0">
+                <a:hlinkClick r:id="rId3"/>
+              </a:rPr>
+              <a:t>://en.wikipedia.org/wiki/Central_processing_unit#/</a:t>
+            </a:r>
+            <a:r>
+              <a:rPr lang="en-GB" sz="1100" dirty="0" smtClean="0">
+                <a:hlinkClick r:id="rId3"/>
+              </a:rPr>
+              <a:t>media/File:Intel_80486DX2_bottom.jpg</a:t>
+            </a:r>
+            <a:r>
+              <a:rPr lang="en-GB" sz="1100" dirty="0" smtClean="0"/>
+              <a:t>. </a:t>
+            </a:r>
+            <a:r>
+              <a:rPr lang="en-GB" sz="1100" dirty="0"/>
+              <a:t>Photography © Andrew Dunn, 2005 CC BY-SA 2.0</a:t>
+            </a:r>
+            <a:endParaRPr lang="en-GB" sz="1000" dirty="0"/>
           </a:p>
         </p:txBody>
       </p:sp>
@@ -5255,8 +5316,12 @@
           </a:p>
           <a:p>
             <a:r>
+              <a:rPr lang="en-GB" sz="1400" i="1" dirty="0"/>
+              <a:t>Source</a:t>
+            </a:r>
+            <a:r>
               <a:rPr lang="en-GB" sz="1400" dirty="0"/>
-              <a:t>Source: Photograph by </a:t>
+              <a:t>: Photograph by </a:t>
             </a:r>
             <a:r>
               <a:rPr lang="en-GB" sz="1400" dirty="0" err="1"/>
@@ -5394,7 +5459,7 @@
             </a:r>
             <a:r>
               <a:rPr lang="en-US" dirty="0" smtClean="0"/>
-              <a:t> faster / more expensive; CPU intensive operations</a:t>
+              <a:t> faster /more expensive; CPU intensive operations</a:t>
             </a:r>
           </a:p>
           <a:p>
@@ -5488,8 +5553,12 @@
           </a:p>
           <a:p>
             <a:r>
+              <a:rPr lang="en-GB" sz="1400" i="1" dirty="0" smtClean="0"/>
+              <a:t>Source</a:t>
+            </a:r>
+            <a:r>
               <a:rPr lang="en-GB" sz="1400" dirty="0" smtClean="0"/>
-              <a:t>Source: https</a:t>
+              <a:t>: https</a:t>
             </a:r>
             <a:r>
               <a:rPr lang="en-GB" sz="1400" dirty="0"/>
@@ -5711,35 +5780,46 @@
           <a:lstStyle/>
           <a:p>
             <a:r>
-              <a:rPr lang="en-GB" sz="1400" smtClean="0"/>
+              <a:rPr lang="en-GB" sz="1400" dirty="0" smtClean="0"/>
               <a:t>A Solid State Drive</a:t>
             </a:r>
           </a:p>
           <a:p>
             <a:r>
+              <a:rPr lang="en-GB" sz="1400" i="1" dirty="0" smtClean="0"/>
+              <a:t>Source</a:t>
+            </a:r>
+            <a:r>
               <a:rPr lang="en-GB" sz="1400" dirty="0" smtClean="0"/>
-              <a:t>Source: https</a:t>
+              <a:t>: </a:t>
+            </a:r>
+            <a:r>
+              <a:rPr lang="en-GB" sz="1400" dirty="0" smtClean="0">
+                <a:hlinkClick r:id="rId3"/>
+              </a:rPr>
+              <a:t>https</a:t>
+            </a:r>
+            <a:r>
+              <a:rPr lang="en-GB" sz="1400" dirty="0">
+                <a:hlinkClick r:id="rId3"/>
+              </a:rPr>
+              <a:t>://en.wikipedia.org/wiki/Computer_memory#/</a:t>
+            </a:r>
+            <a:r>
+              <a:rPr lang="en-GB" sz="1400" dirty="0" smtClean="0">
+                <a:hlinkClick r:id="rId3"/>
+              </a:rPr>
+              <a:t>media/File:Intel_X25-M_Solid-State_Drive.jpg</a:t>
+            </a:r>
+            <a:r>
+              <a:rPr lang="en-GB" sz="1400" dirty="0" smtClean="0"/>
+              <a:t> </a:t>
             </a:r>
             <a:r>
               <a:rPr lang="en-GB" sz="1400" dirty="0"/>
-              <a:t>://</a:t>
-            </a:r>
-            <a:r>
-              <a:rPr lang="en-GB" sz="1400" dirty="0" err="1"/>
-              <a:t>en.wikipedia.org</a:t>
-            </a:r>
-            <a:r>
-              <a:rPr lang="en-GB" sz="1400" dirty="0"/>
-              <a:t>/wiki/</a:t>
-            </a:r>
-            <a:r>
-              <a:rPr lang="en-GB" sz="1400" dirty="0" err="1"/>
-              <a:t>Computer_memory</a:t>
-            </a:r>
-            <a:r>
-              <a:rPr lang="en-GB" sz="1400" dirty="0"/>
-              <a:t>#/media/File:Intel_X25-M_Solid-State_Drive.jpg</a:t>
-            </a:r>
+              <a:t>CC BY 2.0</a:t>
+            </a:r>
+            <a:endParaRPr lang="en-GB" sz="1100" dirty="0"/>
           </a:p>
         </p:txBody>
       </p:sp>

</xml_diff>